<commit_message>
updated a few things...
</commit_message>
<xml_diff>
--- a/Deliverables/Deliv_2/Deliv_2_Presentation.pptx
+++ b/Deliverables/Deliv_2/Deliv_2_Presentation.pptx
@@ -109,6 +109,11 @@
       </a:defRPr>
     </a:lvl9pPr>
   </p:defaultTextStyle>
+  <p:extLst>
+    <p:ext uri="{EFAFB233-063F-42B5-8137-9DF3F51BA10A}">
+      <p15:sldGuideLst xmlns:p15="http://schemas.microsoft.com/office/powerpoint/2012/main"/>
+    </p:ext>
+  </p:extLst>
 </p:presentation>
 </file>
 
@@ -243,7 +248,7 @@
           <a:p>
             <a:fld id="{FE3C4DA6-61A5-A94B-ACB3-25E4461590D5}" type="datetimeFigureOut">
               <a:rPr lang="en-US" smtClean="0"/>
-              <a:t>5/6/18</a:t>
+              <a:t>5/7/18</a:t>
             </a:fld>
             <a:endParaRPr lang="en-US"/>
           </a:p>
@@ -413,7 +418,7 @@
           <a:p>
             <a:fld id="{FE3C4DA6-61A5-A94B-ACB3-25E4461590D5}" type="datetimeFigureOut">
               <a:rPr lang="en-US" smtClean="0"/>
-              <a:t>5/6/18</a:t>
+              <a:t>5/7/18</a:t>
             </a:fld>
             <a:endParaRPr lang="en-US"/>
           </a:p>
@@ -593,7 +598,7 @@
           <a:p>
             <a:fld id="{FE3C4DA6-61A5-A94B-ACB3-25E4461590D5}" type="datetimeFigureOut">
               <a:rPr lang="en-US" smtClean="0"/>
-              <a:t>5/6/18</a:t>
+              <a:t>5/7/18</a:t>
             </a:fld>
             <a:endParaRPr lang="en-US"/>
           </a:p>
@@ -763,7 +768,7 @@
           <a:p>
             <a:fld id="{FE3C4DA6-61A5-A94B-ACB3-25E4461590D5}" type="datetimeFigureOut">
               <a:rPr lang="en-US" smtClean="0"/>
-              <a:t>5/6/18</a:t>
+              <a:t>5/7/18</a:t>
             </a:fld>
             <a:endParaRPr lang="en-US"/>
           </a:p>
@@ -1009,7 +1014,7 @@
           <a:p>
             <a:fld id="{FE3C4DA6-61A5-A94B-ACB3-25E4461590D5}" type="datetimeFigureOut">
               <a:rPr lang="en-US" smtClean="0"/>
-              <a:t>5/6/18</a:t>
+              <a:t>5/7/18</a:t>
             </a:fld>
             <a:endParaRPr lang="en-US"/>
           </a:p>
@@ -1241,7 +1246,7 @@
           <a:p>
             <a:fld id="{FE3C4DA6-61A5-A94B-ACB3-25E4461590D5}" type="datetimeFigureOut">
               <a:rPr lang="en-US" smtClean="0"/>
-              <a:t>5/6/18</a:t>
+              <a:t>5/7/18</a:t>
             </a:fld>
             <a:endParaRPr lang="en-US"/>
           </a:p>
@@ -1608,7 +1613,7 @@
           <a:p>
             <a:fld id="{FE3C4DA6-61A5-A94B-ACB3-25E4461590D5}" type="datetimeFigureOut">
               <a:rPr lang="en-US" smtClean="0"/>
-              <a:t>5/6/18</a:t>
+              <a:t>5/7/18</a:t>
             </a:fld>
             <a:endParaRPr lang="en-US"/>
           </a:p>
@@ -1726,7 +1731,7 @@
           <a:p>
             <a:fld id="{FE3C4DA6-61A5-A94B-ACB3-25E4461590D5}" type="datetimeFigureOut">
               <a:rPr lang="en-US" smtClean="0"/>
-              <a:t>5/6/18</a:t>
+              <a:t>5/7/18</a:t>
             </a:fld>
             <a:endParaRPr lang="en-US"/>
           </a:p>
@@ -1821,7 +1826,7 @@
           <a:p>
             <a:fld id="{FE3C4DA6-61A5-A94B-ACB3-25E4461590D5}" type="datetimeFigureOut">
               <a:rPr lang="en-US" smtClean="0"/>
-              <a:t>5/6/18</a:t>
+              <a:t>5/7/18</a:t>
             </a:fld>
             <a:endParaRPr lang="en-US"/>
           </a:p>
@@ -2098,7 +2103,7 @@
           <a:p>
             <a:fld id="{FE3C4DA6-61A5-A94B-ACB3-25E4461590D5}" type="datetimeFigureOut">
               <a:rPr lang="en-US" smtClean="0"/>
-              <a:t>5/6/18</a:t>
+              <a:t>5/7/18</a:t>
             </a:fld>
             <a:endParaRPr lang="en-US"/>
           </a:p>
@@ -2351,7 +2356,7 @@
           <a:p>
             <a:fld id="{FE3C4DA6-61A5-A94B-ACB3-25E4461590D5}" type="datetimeFigureOut">
               <a:rPr lang="en-US" smtClean="0"/>
-              <a:t>5/6/18</a:t>
+              <a:t>5/7/18</a:t>
             </a:fld>
             <a:endParaRPr lang="en-US"/>
           </a:p>
@@ -2564,7 +2569,7 @@
           <a:p>
             <a:fld id="{FE3C4DA6-61A5-A94B-ACB3-25E4461590D5}" type="datetimeFigureOut">
               <a:rPr lang="en-US" smtClean="0"/>
-              <a:t>5/6/18</a:t>
+              <a:t>5/7/18</a:t>
             </a:fld>
             <a:endParaRPr lang="en-US"/>
           </a:p>
@@ -3169,7 +3174,9 @@
         </p:nvSpPr>
         <p:spPr/>
         <p:txBody>
-          <a:bodyPr/>
+          <a:bodyPr>
+            <a:normAutofit fontScale="85000" lnSpcReduction="20000"/>
+          </a:bodyPr>
           <a:lstStyle/>
           <a:p>
             <a:pPr marL="0" marR="0" lvl="0" indent="0" defTabSz="914400" eaLnBrk="1" fontAlgn="auto" latinLnBrk="0" hangingPunct="1">
@@ -3216,6 +3223,7 @@
               <a:rPr lang="en-US" dirty="0" smtClean="0"/>
               <a:t>-processing </a:t>
             </a:r>
+            <a:endParaRPr lang="en-US" dirty="0" smtClean="0"/>
           </a:p>
           <a:p>
             <a:pPr marL="0" marR="0" lvl="0" indent="0" defTabSz="914400" eaLnBrk="1" fontAlgn="auto" latinLnBrk="0" hangingPunct="1">
@@ -3235,30 +3243,159 @@
               <a:tabLst/>
               <a:defRPr/>
             </a:pPr>
-            <a:r>
-              <a:rPr lang="en-US" dirty="0" smtClean="0"/>
-              <a:t>-description of audio features</a:t>
-            </a:r>
-          </a:p>
-          <a:p>
-            <a:pPr marL="0" lvl="0" indent="0">
+            <a:endParaRPr lang="en-US" dirty="0"/>
+          </a:p>
+          <a:p>
+            <a:pPr marL="0" marR="0" lvl="0" indent="0" defTabSz="914400" eaLnBrk="1" fontAlgn="auto" latinLnBrk="0" hangingPunct="1">
               <a:lnSpc>
                 <a:spcPct val="100000"/>
               </a:lnSpc>
               <a:spcBef>
                 <a:spcPts val="0"/>
               </a:spcBef>
-              <a:buNone/>
+              <a:spcAft>
+                <a:spcPts val="0"/>
+              </a:spcAft>
+              <a:buClrTx/>
+              <a:buSzTx/>
+              <a:buFontTx/>
+              <a:buNone/>
+              <a:tabLst/>
+              <a:defRPr/>
             </a:pPr>
             <a:r>
               <a:rPr lang="en-US" dirty="0" smtClean="0"/>
-              <a:t>** </a:t>
-            </a:r>
-            <a:r>
-              <a:rPr lang="en-US" dirty="0" smtClean="0">
-                <a:hlinkClick r:id="rId2"/>
-              </a:rPr>
-              <a:t>link to description</a:t>
+              <a:t>-description of audio features</a:t>
+            </a:r>
+            <a:r>
+              <a:rPr lang="mr-IN" dirty="0" smtClean="0"/>
+              <a:t>…</a:t>
+            </a:r>
+            <a:endParaRPr lang="en-US" dirty="0" smtClean="0"/>
+          </a:p>
+          <a:p>
+            <a:pPr marL="0" marR="0" lvl="0" indent="0" defTabSz="914400" eaLnBrk="1" fontAlgn="auto" latinLnBrk="0" hangingPunct="1">
+              <a:lnSpc>
+                <a:spcPct val="100000"/>
+              </a:lnSpc>
+              <a:spcBef>
+                <a:spcPts val="0"/>
+              </a:spcBef>
+              <a:spcAft>
+                <a:spcPts val="0"/>
+              </a:spcAft>
+              <a:buClrTx/>
+              <a:buSzTx/>
+              <a:buFontTx/>
+              <a:buNone/>
+              <a:tabLst/>
+              <a:defRPr/>
+            </a:pPr>
+            <a:endParaRPr lang="en-US" dirty="0" smtClean="0"/>
+          </a:p>
+          <a:p>
+            <a:pPr lvl="0">
+              <a:lnSpc>
+                <a:spcPct val="100000"/>
+              </a:lnSpc>
+              <a:spcBef>
+                <a:spcPts val="0"/>
+              </a:spcBef>
+              <a:buFontTx/>
+              <a:buChar char="-"/>
+              <a:defRPr/>
+            </a:pPr>
+            <a:r>
+              <a:rPr lang="en-US" dirty="0" err="1" smtClean="0"/>
+              <a:t>Danceability</a:t>
+            </a:r>
+            <a:r>
+              <a:rPr lang="en-US" dirty="0" smtClean="0"/>
+              <a:t> </a:t>
+            </a:r>
+            <a:r>
+              <a:rPr lang="en-US" dirty="0"/>
+              <a:t>- how suitable a track is for dancing based on a combination of musical  elements as well as overall regularity</a:t>
+            </a:r>
+            <a:r>
+              <a:rPr lang="en-US" dirty="0" smtClean="0"/>
+              <a:t>.</a:t>
+            </a:r>
+          </a:p>
+          <a:p>
+            <a:pPr lvl="0">
+              <a:lnSpc>
+                <a:spcPct val="100000"/>
+              </a:lnSpc>
+              <a:spcBef>
+                <a:spcPts val="0"/>
+              </a:spcBef>
+              <a:buFontTx/>
+              <a:buChar char="-"/>
+              <a:defRPr/>
+            </a:pPr>
+            <a:r>
+              <a:rPr lang="en-US" dirty="0" smtClean="0"/>
+              <a:t> </a:t>
+            </a:r>
+            <a:r>
+              <a:rPr lang="en-US" dirty="0"/>
+              <a:t>- Energy - how intense or active a track is. Death metal is high energy while a Claire de Lune is low energy. </a:t>
+            </a:r>
+            <a:endParaRPr lang="en-US" dirty="0" smtClean="0"/>
+          </a:p>
+          <a:p>
+            <a:pPr lvl="0">
+              <a:lnSpc>
+                <a:spcPct val="100000"/>
+              </a:lnSpc>
+              <a:spcBef>
+                <a:spcPts val="0"/>
+              </a:spcBef>
+              <a:buFontTx/>
+              <a:buChar char="-"/>
+              <a:defRPr/>
+            </a:pPr>
+            <a:r>
+              <a:rPr lang="en-US" dirty="0" smtClean="0"/>
+              <a:t>- </a:t>
+            </a:r>
+            <a:r>
+              <a:rPr lang="en-US" dirty="0"/>
+              <a:t>Loudness - the overall loudness of a track measured in decibels, averaged across the </a:t>
+            </a:r>
+            <a:r>
+              <a:rPr lang="en-US" dirty="0" smtClean="0"/>
+              <a:t>track</a:t>
+            </a:r>
+          </a:p>
+          <a:p>
+            <a:pPr lvl="0">
+              <a:lnSpc>
+                <a:spcPct val="100000"/>
+              </a:lnSpc>
+              <a:spcBef>
+                <a:spcPts val="0"/>
+              </a:spcBef>
+              <a:buFontTx/>
+              <a:buChar char="-"/>
+              <a:defRPr/>
+            </a:pPr>
+            <a:r>
+              <a:rPr lang="en-US" dirty="0" smtClean="0"/>
+              <a:t>- </a:t>
+            </a:r>
+            <a:r>
+              <a:rPr lang="en-US" dirty="0"/>
+              <a:t>Tempo - the tempo in beats per minutes - Valence - measure describing the musical </a:t>
+            </a:r>
+            <a:r>
+              <a:rPr lang="en-US" dirty="0" err="1" smtClean="0"/>
+              <a:t>positiveness</a:t>
+            </a:r>
+            <a:r>
+              <a:rPr lang="en-US" dirty="0"/>
+              <a:t>; high valence sounds positive while low valence sounds negative</a:t>
             </a:r>
             <a:endParaRPr lang="en-US" dirty="0"/>
           </a:p>

</xml_diff>